<commit_message>
Anglais ORAL 1 fini
</commit_message>
<xml_diff>
--- a/Anglais/ORAL_1/DALL-E_2.pptx
+++ b/Anglais/ORAL_1/DALL-E_2.pptx
@@ -5,17 +5,21 @@
     <p:sldMasterId id="2147483648" r:id="rId4"/>
   </p:sldMasterIdLst>
   <p:notesMasterIdLst>
-    <p:notesMasterId r:id="rId13"/>
+    <p:notesMasterId r:id="rId17"/>
   </p:notesMasterIdLst>
   <p:sldIdLst>
     <p:sldId id="256" r:id="rId5"/>
     <p:sldId id="257" r:id="rId6"/>
-    <p:sldId id="258" r:id="rId7"/>
-    <p:sldId id="259" r:id="rId8"/>
-    <p:sldId id="260" r:id="rId9"/>
-    <p:sldId id="261" r:id="rId10"/>
-    <p:sldId id="262" r:id="rId11"/>
-    <p:sldId id="263" r:id="rId12"/>
+    <p:sldId id="264" r:id="rId7"/>
+    <p:sldId id="267" r:id="rId8"/>
+    <p:sldId id="266" r:id="rId9"/>
+    <p:sldId id="265" r:id="rId10"/>
+    <p:sldId id="258" r:id="rId11"/>
+    <p:sldId id="259" r:id="rId12"/>
+    <p:sldId id="260" r:id="rId13"/>
+    <p:sldId id="261" r:id="rId14"/>
+    <p:sldId id="262" r:id="rId15"/>
+    <p:sldId id="263" r:id="rId16"/>
   </p:sldIdLst>
   <p:sldSz cx="9144000" cy="6858000" type="screen4x3"/>
   <p:notesSz cx="6858000" cy="9144000"/>
@@ -216,7 +220,7 @@
             <a:fld id="{3E5A5963-AF4B-496C-AEFE-B82207452C08}" type="datetimeFigureOut">
               <a:rPr lang="en-US" smtClean="0"/>
               <a:pPr/>
-              <a:t>9/18/2022</a:t>
+              <a:t>9/20/2022</a:t>
             </a:fld>
             <a:endParaRPr lang="en-US"/>
           </a:p>
@@ -736,7 +740,7 @@
                 </a:solidFill>
               </a:rPr>
               <a:pPr/>
-              <a:t>9/18/2022</a:t>
+              <a:t>9/20/2022</a:t>
             </a:fld>
             <a:endParaRPr lang="en-US">
               <a:solidFill>
@@ -979,7 +983,7 @@
                 </a:solidFill>
               </a:rPr>
               <a:pPr/>
-              <a:t>9/18/2022</a:t>
+              <a:t>9/20/2022</a:t>
             </a:fld>
             <a:endParaRPr lang="en-US">
               <a:solidFill>
@@ -1444,565 +1448,7 @@
 </p:sld>
 </file>
 
-<file path=ppt/slides/slide2.xml><?xml version="1.0" encoding="utf-8"?>
-<p:sld xmlns:a="http://schemas.openxmlformats.org/drawingml/2006/main" xmlns:r="http://schemas.openxmlformats.org/officeDocument/2006/relationships" xmlns:p="http://schemas.openxmlformats.org/presentationml/2006/main">
-  <p:cSld>
-    <p:spTree>
-      <p:nvGrpSpPr>
-        <p:cNvPr id="1" name=""/>
-        <p:cNvGrpSpPr/>
-        <p:nvPr/>
-      </p:nvGrpSpPr>
-      <p:grpSpPr>
-        <a:xfrm>
-          <a:off x="0" y="0"/>
-          <a:ext cx="0" cy="0"/>
-          <a:chOff x="0" y="0"/>
-          <a:chExt cx="0" cy="0"/>
-        </a:xfrm>
-      </p:grpSpPr>
-      <p:pic>
-        <p:nvPicPr>
-          <p:cNvPr id="5" name="Image 4" descr="Une image contenant noir, transport&#10;&#10;Description générée automatiquement">
-            <a:extLst>
-              <a:ext uri="{FF2B5EF4-FFF2-40B4-BE49-F238E27FC236}">
-                <a16:creationId xmlns:a16="http://schemas.microsoft.com/office/drawing/2014/main" id="{6C616B9E-2655-BEDC-0BB6-F3EDDFBA3B42}"/>
-              </a:ext>
-            </a:extLst>
-          </p:cNvPr>
-          <p:cNvPicPr>
-            <a:picLocks noChangeAspect="1"/>
-          </p:cNvPicPr>
-          <p:nvPr/>
-        </p:nvPicPr>
-        <p:blipFill>
-          <a:blip r:embed="rId2">
-            <a:extLst>
-              <a:ext uri="{28A0092B-C50C-407E-A947-70E740481C1C}">
-                <a14:useLocalDpi xmlns:a14="http://schemas.microsoft.com/office/drawing/2010/main" val="0"/>
-              </a:ext>
-            </a:extLst>
-          </a:blip>
-          <a:stretch>
-            <a:fillRect/>
-          </a:stretch>
-        </p:blipFill>
-        <p:spPr>
-          <a:xfrm>
-            <a:off x="0" y="854324"/>
-            <a:ext cx="9144000" cy="5149352"/>
-          </a:xfrm>
-          <a:prstGeom prst="rect">
-            <a:avLst/>
-          </a:prstGeom>
-        </p:spPr>
-      </p:pic>
-    </p:spTree>
-    <p:extLst>
-      <p:ext uri="{BB962C8B-B14F-4D97-AF65-F5344CB8AC3E}">
-        <p14:creationId xmlns:p14="http://schemas.microsoft.com/office/powerpoint/2010/main" val="224226682"/>
-      </p:ext>
-    </p:extLst>
-  </p:cSld>
-  <p:clrMapOvr>
-    <a:masterClrMapping/>
-  </p:clrMapOvr>
-  <p:transition>
-    <p:fade/>
-  </p:transition>
-</p:sld>
-</file>
-
-<file path=ppt/slides/slide3.xml><?xml version="1.0" encoding="utf-8"?>
-<p:sld xmlns:a="http://schemas.openxmlformats.org/drawingml/2006/main" xmlns:r="http://schemas.openxmlformats.org/officeDocument/2006/relationships" xmlns:p="http://schemas.openxmlformats.org/presentationml/2006/main">
-  <p:cSld>
-    <p:spTree>
-      <p:nvGrpSpPr>
-        <p:cNvPr id="1" name=""/>
-        <p:cNvGrpSpPr/>
-        <p:nvPr/>
-      </p:nvGrpSpPr>
-      <p:grpSpPr>
-        <a:xfrm>
-          <a:off x="0" y="0"/>
-          <a:ext cx="0" cy="0"/>
-          <a:chOff x="0" y="0"/>
-          <a:chExt cx="0" cy="0"/>
-        </a:xfrm>
-      </p:grpSpPr>
-      <p:sp>
-        <p:nvSpPr>
-          <p:cNvPr id="4" name="ZoneTexte 3">
-            <a:extLst>
-              <a:ext uri="{FF2B5EF4-FFF2-40B4-BE49-F238E27FC236}">
-                <a16:creationId xmlns:a16="http://schemas.microsoft.com/office/drawing/2014/main" id="{06BF862B-D8A7-1544-37B4-09E594EF052F}"/>
-              </a:ext>
-            </a:extLst>
-          </p:cNvPr>
-          <p:cNvSpPr txBox="1"/>
-          <p:nvPr/>
-        </p:nvSpPr>
-        <p:spPr>
-          <a:xfrm>
-            <a:off x="563851" y="332656"/>
-            <a:ext cx="8256621" cy="954107"/>
-          </a:xfrm>
-          <a:prstGeom prst="rect">
-            <a:avLst/>
-          </a:prstGeom>
-        </p:spPr>
-        <p:style>
-          <a:lnRef idx="3">
-            <a:schemeClr val="lt1"/>
-          </a:lnRef>
-          <a:fillRef idx="1">
-            <a:schemeClr val="dk1"/>
-          </a:fillRef>
-          <a:effectRef idx="1">
-            <a:schemeClr val="dk1"/>
-          </a:effectRef>
-          <a:fontRef idx="minor">
-            <a:schemeClr val="lt1"/>
-          </a:fontRef>
-        </p:style>
-        <p:txBody>
-          <a:bodyPr wrap="square" rtlCol="0">
-            <a:spAutoFit/>
-          </a:bodyPr>
-          <a:lstStyle/>
-          <a:p>
-            <a:pPr algn="ctr"/>
-            <a:r>
-              <a:rPr lang="en-US" sz="2800" b="1" dirty="0">
-                <a:highlight>
-                  <a:srgbClr val="000000"/>
-                </a:highlight>
-              </a:rPr>
-              <a:t>3D render of a cute pig with sunglasses doing a dab on a dark blue background, digital art</a:t>
-            </a:r>
-            <a:endParaRPr lang="fr-FR" sz="2800" b="1" dirty="0">
-              <a:highlight>
-                <a:srgbClr val="000000"/>
-              </a:highlight>
-            </a:endParaRPr>
-          </a:p>
-        </p:txBody>
-      </p:sp>
-      <p:pic>
-        <p:nvPicPr>
-          <p:cNvPr id="12" name="Image 11" descr="Une image contenant lunettes, lunettes de protection, cache-œil, lunettes de soleil&#10;&#10;Description générée automatiquement">
-            <a:extLst>
-              <a:ext uri="{FF2B5EF4-FFF2-40B4-BE49-F238E27FC236}">
-                <a16:creationId xmlns:a16="http://schemas.microsoft.com/office/drawing/2014/main" id="{03627D89-5CC9-5076-173A-DC898B174970}"/>
-              </a:ext>
-            </a:extLst>
-          </p:cNvPr>
-          <p:cNvPicPr>
-            <a:picLocks noChangeAspect="1"/>
-          </p:cNvPicPr>
-          <p:nvPr/>
-        </p:nvPicPr>
-        <p:blipFill>
-          <a:blip r:embed="rId2" cstate="print">
-            <a:extLst>
-              <a:ext uri="{28A0092B-C50C-407E-A947-70E740481C1C}">
-                <a14:useLocalDpi xmlns:a14="http://schemas.microsoft.com/office/drawing/2010/main" val="0"/>
-              </a:ext>
-            </a:extLst>
-          </a:blip>
-          <a:stretch>
-            <a:fillRect/>
-          </a:stretch>
-        </p:blipFill>
-        <p:spPr>
-          <a:xfrm>
-            <a:off x="386560" y="1436763"/>
-            <a:ext cx="2582856" cy="2582856"/>
-          </a:xfrm>
-          <a:prstGeom prst="rect">
-            <a:avLst/>
-          </a:prstGeom>
-        </p:spPr>
-      </p:pic>
-    </p:spTree>
-    <p:extLst>
-      <p:ext uri="{BB962C8B-B14F-4D97-AF65-F5344CB8AC3E}">
-        <p14:creationId xmlns:p14="http://schemas.microsoft.com/office/powerpoint/2010/main" val="192690775"/>
-      </p:ext>
-    </p:extLst>
-  </p:cSld>
-  <p:clrMapOvr>
-    <a:masterClrMapping/>
-  </p:clrMapOvr>
-  <p:transition>
-    <p:fade/>
-  </p:transition>
-</p:sld>
-</file>
-
-<file path=ppt/slides/slide4.xml><?xml version="1.0" encoding="utf-8"?>
-<p:sld xmlns:a="http://schemas.openxmlformats.org/drawingml/2006/main" xmlns:r="http://schemas.openxmlformats.org/officeDocument/2006/relationships" xmlns:p="http://schemas.openxmlformats.org/presentationml/2006/main">
-  <p:cSld>
-    <p:spTree>
-      <p:nvGrpSpPr>
-        <p:cNvPr id="1" name=""/>
-        <p:cNvGrpSpPr/>
-        <p:nvPr/>
-      </p:nvGrpSpPr>
-      <p:grpSpPr>
-        <a:xfrm>
-          <a:off x="0" y="0"/>
-          <a:ext cx="0" cy="0"/>
-          <a:chOff x="0" y="0"/>
-          <a:chExt cx="0" cy="0"/>
-        </a:xfrm>
-      </p:grpSpPr>
-      <p:sp>
-        <p:nvSpPr>
-          <p:cNvPr id="4" name="ZoneTexte 3">
-            <a:extLst>
-              <a:ext uri="{FF2B5EF4-FFF2-40B4-BE49-F238E27FC236}">
-                <a16:creationId xmlns:a16="http://schemas.microsoft.com/office/drawing/2014/main" id="{06BF862B-D8A7-1544-37B4-09E594EF052F}"/>
-              </a:ext>
-            </a:extLst>
-          </p:cNvPr>
-          <p:cNvSpPr txBox="1"/>
-          <p:nvPr/>
-        </p:nvSpPr>
-        <p:spPr>
-          <a:xfrm>
-            <a:off x="563851" y="332656"/>
-            <a:ext cx="8256621" cy="954107"/>
-          </a:xfrm>
-          <a:prstGeom prst="rect">
-            <a:avLst/>
-          </a:prstGeom>
-        </p:spPr>
-        <p:style>
-          <a:lnRef idx="3">
-            <a:schemeClr val="lt1"/>
-          </a:lnRef>
-          <a:fillRef idx="1">
-            <a:schemeClr val="dk1"/>
-          </a:fillRef>
-          <a:effectRef idx="1">
-            <a:schemeClr val="dk1"/>
-          </a:effectRef>
-          <a:fontRef idx="minor">
-            <a:schemeClr val="lt1"/>
-          </a:fontRef>
-        </p:style>
-        <p:txBody>
-          <a:bodyPr wrap="square" rtlCol="0">
-            <a:spAutoFit/>
-          </a:bodyPr>
-          <a:lstStyle/>
-          <a:p>
-            <a:pPr algn="ctr"/>
-            <a:r>
-              <a:rPr lang="en-US" sz="2800" b="1" dirty="0">
-                <a:highlight>
-                  <a:srgbClr val="000000"/>
-                </a:highlight>
-              </a:rPr>
-              <a:t>3D render of a cute pig with sunglasses doing a dab on a dark blue background, digital art</a:t>
-            </a:r>
-            <a:endParaRPr lang="fr-FR" sz="2800" b="1" dirty="0">
-              <a:highlight>
-                <a:srgbClr val="000000"/>
-              </a:highlight>
-            </a:endParaRPr>
-          </a:p>
-        </p:txBody>
-      </p:sp>
-      <p:pic>
-        <p:nvPicPr>
-          <p:cNvPr id="6" name="Image 5">
-            <a:extLst>
-              <a:ext uri="{FF2B5EF4-FFF2-40B4-BE49-F238E27FC236}">
-                <a16:creationId xmlns:a16="http://schemas.microsoft.com/office/drawing/2014/main" id="{8595E72B-916E-B611-1628-29B809B15786}"/>
-              </a:ext>
-            </a:extLst>
-          </p:cNvPr>
-          <p:cNvPicPr>
-            <a:picLocks noChangeAspect="1"/>
-          </p:cNvPicPr>
-          <p:nvPr/>
-        </p:nvPicPr>
-        <p:blipFill>
-          <a:blip r:embed="rId2" cstate="print">
-            <a:extLst>
-              <a:ext uri="{28A0092B-C50C-407E-A947-70E740481C1C}">
-                <a14:useLocalDpi xmlns:a14="http://schemas.microsoft.com/office/drawing/2010/main" val="0"/>
-              </a:ext>
-            </a:extLst>
-          </a:blip>
-          <a:stretch>
-            <a:fillRect/>
-          </a:stretch>
-        </p:blipFill>
-        <p:spPr>
-          <a:xfrm>
-            <a:off x="386560" y="4241627"/>
-            <a:ext cx="2582856" cy="2582856"/>
-          </a:xfrm>
-          <a:prstGeom prst="rect">
-            <a:avLst/>
-          </a:prstGeom>
-        </p:spPr>
-      </p:pic>
-      <p:pic>
-        <p:nvPicPr>
-          <p:cNvPr id="12" name="Image 11" descr="Une image contenant lunettes, lunettes de protection, cache-œil, lunettes de soleil&#10;&#10;Description générée automatiquement">
-            <a:extLst>
-              <a:ext uri="{FF2B5EF4-FFF2-40B4-BE49-F238E27FC236}">
-                <a16:creationId xmlns:a16="http://schemas.microsoft.com/office/drawing/2014/main" id="{03627D89-5CC9-5076-173A-DC898B174970}"/>
-              </a:ext>
-            </a:extLst>
-          </p:cNvPr>
-          <p:cNvPicPr>
-            <a:picLocks noChangeAspect="1"/>
-          </p:cNvPicPr>
-          <p:nvPr/>
-        </p:nvPicPr>
-        <p:blipFill>
-          <a:blip r:embed="rId3" cstate="print">
-            <a:extLst>
-              <a:ext uri="{28A0092B-C50C-407E-A947-70E740481C1C}">
-                <a14:useLocalDpi xmlns:a14="http://schemas.microsoft.com/office/drawing/2010/main" val="0"/>
-              </a:ext>
-            </a:extLst>
-          </a:blip>
-          <a:stretch>
-            <a:fillRect/>
-          </a:stretch>
-        </p:blipFill>
-        <p:spPr>
-          <a:xfrm>
-            <a:off x="386560" y="1436763"/>
-            <a:ext cx="2582856" cy="2582856"/>
-          </a:xfrm>
-          <a:prstGeom prst="rect">
-            <a:avLst/>
-          </a:prstGeom>
-        </p:spPr>
-      </p:pic>
-    </p:spTree>
-    <p:extLst>
-      <p:ext uri="{BB962C8B-B14F-4D97-AF65-F5344CB8AC3E}">
-        <p14:creationId xmlns:p14="http://schemas.microsoft.com/office/powerpoint/2010/main" val="3973476895"/>
-      </p:ext>
-    </p:extLst>
-  </p:cSld>
-  <p:clrMapOvr>
-    <a:masterClrMapping/>
-  </p:clrMapOvr>
-  <p:transition>
-    <p:fade/>
-  </p:transition>
-</p:sld>
-</file>
-
-<file path=ppt/slides/slide5.xml><?xml version="1.0" encoding="utf-8"?>
-<p:sld xmlns:a="http://schemas.openxmlformats.org/drawingml/2006/main" xmlns:r="http://schemas.openxmlformats.org/officeDocument/2006/relationships" xmlns:p="http://schemas.openxmlformats.org/presentationml/2006/main">
-  <p:cSld>
-    <p:spTree>
-      <p:nvGrpSpPr>
-        <p:cNvPr id="1" name=""/>
-        <p:cNvGrpSpPr/>
-        <p:nvPr/>
-      </p:nvGrpSpPr>
-      <p:grpSpPr>
-        <a:xfrm>
-          <a:off x="0" y="0"/>
-          <a:ext cx="0" cy="0"/>
-          <a:chOff x="0" y="0"/>
-          <a:chExt cx="0" cy="0"/>
-        </a:xfrm>
-      </p:grpSpPr>
-      <p:sp>
-        <p:nvSpPr>
-          <p:cNvPr id="4" name="ZoneTexte 3">
-            <a:extLst>
-              <a:ext uri="{FF2B5EF4-FFF2-40B4-BE49-F238E27FC236}">
-                <a16:creationId xmlns:a16="http://schemas.microsoft.com/office/drawing/2014/main" id="{06BF862B-D8A7-1544-37B4-09E594EF052F}"/>
-              </a:ext>
-            </a:extLst>
-          </p:cNvPr>
-          <p:cNvSpPr txBox="1"/>
-          <p:nvPr/>
-        </p:nvSpPr>
-        <p:spPr>
-          <a:xfrm>
-            <a:off x="563851" y="332656"/>
-            <a:ext cx="8256621" cy="954107"/>
-          </a:xfrm>
-          <a:prstGeom prst="rect">
-            <a:avLst/>
-          </a:prstGeom>
-        </p:spPr>
-        <p:style>
-          <a:lnRef idx="3">
-            <a:schemeClr val="lt1"/>
-          </a:lnRef>
-          <a:fillRef idx="1">
-            <a:schemeClr val="dk1"/>
-          </a:fillRef>
-          <a:effectRef idx="1">
-            <a:schemeClr val="dk1"/>
-          </a:effectRef>
-          <a:fontRef idx="minor">
-            <a:schemeClr val="lt1"/>
-          </a:fontRef>
-        </p:style>
-        <p:txBody>
-          <a:bodyPr wrap="square" rtlCol="0">
-            <a:spAutoFit/>
-          </a:bodyPr>
-          <a:lstStyle/>
-          <a:p>
-            <a:pPr algn="ctr"/>
-            <a:r>
-              <a:rPr lang="en-US" sz="2800" b="1" dirty="0">
-                <a:highlight>
-                  <a:srgbClr val="000000"/>
-                </a:highlight>
-              </a:rPr>
-              <a:t>3D render of a cute pig with sunglasses doing a dab on a dark blue background, digital art</a:t>
-            </a:r>
-            <a:endParaRPr lang="fr-FR" sz="2800" b="1" dirty="0">
-              <a:highlight>
-                <a:srgbClr val="000000"/>
-              </a:highlight>
-            </a:endParaRPr>
-          </a:p>
-        </p:txBody>
-      </p:sp>
-      <p:pic>
-        <p:nvPicPr>
-          <p:cNvPr id="6" name="Image 5">
-            <a:extLst>
-              <a:ext uri="{FF2B5EF4-FFF2-40B4-BE49-F238E27FC236}">
-                <a16:creationId xmlns:a16="http://schemas.microsoft.com/office/drawing/2014/main" id="{8595E72B-916E-B611-1628-29B809B15786}"/>
-              </a:ext>
-            </a:extLst>
-          </p:cNvPr>
-          <p:cNvPicPr>
-            <a:picLocks noChangeAspect="1"/>
-          </p:cNvPicPr>
-          <p:nvPr/>
-        </p:nvPicPr>
-        <p:blipFill>
-          <a:blip r:embed="rId2" cstate="print">
-            <a:extLst>
-              <a:ext uri="{28A0092B-C50C-407E-A947-70E740481C1C}">
-                <a14:useLocalDpi xmlns:a14="http://schemas.microsoft.com/office/drawing/2010/main" val="0"/>
-              </a:ext>
-            </a:extLst>
-          </a:blip>
-          <a:stretch>
-            <a:fillRect/>
-          </a:stretch>
-        </p:blipFill>
-        <p:spPr>
-          <a:xfrm>
-            <a:off x="386560" y="4241627"/>
-            <a:ext cx="2582856" cy="2582856"/>
-          </a:xfrm>
-          <a:prstGeom prst="rect">
-            <a:avLst/>
-          </a:prstGeom>
-        </p:spPr>
-      </p:pic>
-      <p:pic>
-        <p:nvPicPr>
-          <p:cNvPr id="8" name="Image 7" descr="Une image contenant lunettes, lunettes de protection, accessoire, lunettes de soleil&#10;&#10;Description générée automatiquement">
-            <a:extLst>
-              <a:ext uri="{FF2B5EF4-FFF2-40B4-BE49-F238E27FC236}">
-                <a16:creationId xmlns:a16="http://schemas.microsoft.com/office/drawing/2014/main" id="{B67BBBC4-F518-D4EB-9D70-CC1A613EF95E}"/>
-              </a:ext>
-            </a:extLst>
-          </p:cNvPr>
-          <p:cNvPicPr>
-            <a:picLocks noChangeAspect="1"/>
-          </p:cNvPicPr>
-          <p:nvPr/>
-        </p:nvPicPr>
-        <p:blipFill>
-          <a:blip r:embed="rId3" cstate="print">
-            <a:extLst>
-              <a:ext uri="{28A0092B-C50C-407E-A947-70E740481C1C}">
-                <a14:useLocalDpi xmlns:a14="http://schemas.microsoft.com/office/drawing/2010/main" val="0"/>
-              </a:ext>
-            </a:extLst>
-          </a:blip>
-          <a:stretch>
-            <a:fillRect/>
-          </a:stretch>
-        </p:blipFill>
-        <p:spPr>
-          <a:xfrm>
-            <a:off x="5868144" y="4241627"/>
-            <a:ext cx="2582856" cy="2582856"/>
-          </a:xfrm>
-          <a:prstGeom prst="rect">
-            <a:avLst/>
-          </a:prstGeom>
-        </p:spPr>
-      </p:pic>
-      <p:pic>
-        <p:nvPicPr>
-          <p:cNvPr id="12" name="Image 11" descr="Une image contenant lunettes, lunettes de protection, cache-œil, lunettes de soleil&#10;&#10;Description générée automatiquement">
-            <a:extLst>
-              <a:ext uri="{FF2B5EF4-FFF2-40B4-BE49-F238E27FC236}">
-                <a16:creationId xmlns:a16="http://schemas.microsoft.com/office/drawing/2014/main" id="{03627D89-5CC9-5076-173A-DC898B174970}"/>
-              </a:ext>
-            </a:extLst>
-          </p:cNvPr>
-          <p:cNvPicPr>
-            <a:picLocks noChangeAspect="1"/>
-          </p:cNvPicPr>
-          <p:nvPr/>
-        </p:nvPicPr>
-        <p:blipFill>
-          <a:blip r:embed="rId4" cstate="print">
-            <a:extLst>
-              <a:ext uri="{28A0092B-C50C-407E-A947-70E740481C1C}">
-                <a14:useLocalDpi xmlns:a14="http://schemas.microsoft.com/office/drawing/2010/main" val="0"/>
-              </a:ext>
-            </a:extLst>
-          </a:blip>
-          <a:stretch>
-            <a:fillRect/>
-          </a:stretch>
-        </p:blipFill>
-        <p:spPr>
-          <a:xfrm>
-            <a:off x="386560" y="1436763"/>
-            <a:ext cx="2582856" cy="2582856"/>
-          </a:xfrm>
-          <a:prstGeom prst="rect">
-            <a:avLst/>
-          </a:prstGeom>
-        </p:spPr>
-      </p:pic>
-    </p:spTree>
-    <p:extLst>
-      <p:ext uri="{BB962C8B-B14F-4D97-AF65-F5344CB8AC3E}">
-        <p14:creationId xmlns:p14="http://schemas.microsoft.com/office/powerpoint/2010/main" val="1591607921"/>
-      </p:ext>
-    </p:extLst>
-  </p:cSld>
-  <p:clrMapOvr>
-    <a:masterClrMapping/>
-  </p:clrMapOvr>
-  <p:transition>
-    <p:fade/>
-  </p:transition>
-</p:sld>
-</file>
-
-<file path=ppt/slides/slide6.xml><?xml version="1.0" encoding="utf-8"?>
+<file path=ppt/slides/slide10.xml><?xml version="1.0" encoding="utf-8"?>
 <p:sld xmlns:a="http://schemas.openxmlformats.org/drawingml/2006/main" xmlns:r="http://schemas.openxmlformats.org/officeDocument/2006/relationships" xmlns:p="http://schemas.openxmlformats.org/presentationml/2006/main">
   <p:cSld>
     <p:spTree>
@@ -2237,7 +1683,7 @@
 </p:sld>
 </file>
 
-<file path=ppt/slides/slide7.xml><?xml version="1.0" encoding="utf-8"?>
+<file path=ppt/slides/slide11.xml><?xml version="1.0" encoding="utf-8"?>
 <p:sld xmlns:a="http://schemas.openxmlformats.org/drawingml/2006/main" xmlns:r="http://schemas.openxmlformats.org/officeDocument/2006/relationships" xmlns:p="http://schemas.openxmlformats.org/presentationml/2006/main">
   <p:cSld>
     <p:spTree>
@@ -2358,7 +1804,7 @@
 </p:sld>
 </file>
 
-<file path=ppt/slides/slide8.xml><?xml version="1.0" encoding="utf-8"?>
+<file path=ppt/slides/slide12.xml><?xml version="1.0" encoding="utf-8"?>
 <p:sld xmlns:a="http://schemas.openxmlformats.org/drawingml/2006/main" xmlns:r="http://schemas.openxmlformats.org/officeDocument/2006/relationships" xmlns:p="http://schemas.openxmlformats.org/presentationml/2006/main">
   <p:cSld>
     <p:spTree>
@@ -2503,6 +1949,996 @@
     <p:extLst>
       <p:ext uri="{BB962C8B-B14F-4D97-AF65-F5344CB8AC3E}">
         <p14:creationId xmlns:p14="http://schemas.microsoft.com/office/powerpoint/2010/main" val="3332952917"/>
+      </p:ext>
+    </p:extLst>
+  </p:cSld>
+  <p:clrMapOvr>
+    <a:masterClrMapping/>
+  </p:clrMapOvr>
+  <p:transition>
+    <p:fade/>
+  </p:transition>
+</p:sld>
+</file>
+
+<file path=ppt/slides/slide2.xml><?xml version="1.0" encoding="utf-8"?>
+<p:sld xmlns:a="http://schemas.openxmlformats.org/drawingml/2006/main" xmlns:r="http://schemas.openxmlformats.org/officeDocument/2006/relationships" xmlns:p="http://schemas.openxmlformats.org/presentationml/2006/main">
+  <p:cSld>
+    <p:spTree>
+      <p:nvGrpSpPr>
+        <p:cNvPr id="1" name=""/>
+        <p:cNvGrpSpPr/>
+        <p:nvPr/>
+      </p:nvGrpSpPr>
+      <p:grpSpPr>
+        <a:xfrm>
+          <a:off x="0" y="0"/>
+          <a:ext cx="0" cy="0"/>
+          <a:chOff x="0" y="0"/>
+          <a:chExt cx="0" cy="0"/>
+        </a:xfrm>
+      </p:grpSpPr>
+      <p:pic>
+        <p:nvPicPr>
+          <p:cNvPr id="5" name="Image 4" descr="Une image contenant noir, transport&#10;&#10;Description générée automatiquement">
+            <a:extLst>
+              <a:ext uri="{FF2B5EF4-FFF2-40B4-BE49-F238E27FC236}">
+                <a16:creationId xmlns:a16="http://schemas.microsoft.com/office/drawing/2014/main" id="{6C616B9E-2655-BEDC-0BB6-F3EDDFBA3B42}"/>
+              </a:ext>
+            </a:extLst>
+          </p:cNvPr>
+          <p:cNvPicPr>
+            <a:picLocks noChangeAspect="1"/>
+          </p:cNvPicPr>
+          <p:nvPr/>
+        </p:nvPicPr>
+        <p:blipFill>
+          <a:blip r:embed="rId2">
+            <a:extLst>
+              <a:ext uri="{28A0092B-C50C-407E-A947-70E740481C1C}">
+                <a14:useLocalDpi xmlns:a14="http://schemas.microsoft.com/office/drawing/2010/main" val="0"/>
+              </a:ext>
+            </a:extLst>
+          </a:blip>
+          <a:stretch>
+            <a:fillRect/>
+          </a:stretch>
+        </p:blipFill>
+        <p:spPr>
+          <a:xfrm>
+            <a:off x="0" y="854324"/>
+            <a:ext cx="9144000" cy="5149352"/>
+          </a:xfrm>
+          <a:prstGeom prst="rect">
+            <a:avLst/>
+          </a:prstGeom>
+        </p:spPr>
+      </p:pic>
+    </p:spTree>
+    <p:extLst>
+      <p:ext uri="{BB962C8B-B14F-4D97-AF65-F5344CB8AC3E}">
+        <p14:creationId xmlns:p14="http://schemas.microsoft.com/office/powerpoint/2010/main" val="224226682"/>
+      </p:ext>
+    </p:extLst>
+  </p:cSld>
+  <p:clrMapOvr>
+    <a:masterClrMapping/>
+  </p:clrMapOvr>
+  <p:transition>
+    <p:fade/>
+  </p:transition>
+</p:sld>
+</file>
+
+<file path=ppt/slides/slide3.xml><?xml version="1.0" encoding="utf-8"?>
+<p:sld xmlns:a="http://schemas.openxmlformats.org/drawingml/2006/main" xmlns:r="http://schemas.openxmlformats.org/officeDocument/2006/relationships" xmlns:p="http://schemas.openxmlformats.org/presentationml/2006/main">
+  <p:cSld>
+    <p:spTree>
+      <p:nvGrpSpPr>
+        <p:cNvPr id="1" name=""/>
+        <p:cNvGrpSpPr/>
+        <p:nvPr/>
+      </p:nvGrpSpPr>
+      <p:grpSpPr>
+        <a:xfrm>
+          <a:off x="0" y="0"/>
+          <a:ext cx="0" cy="0"/>
+          <a:chOff x="0" y="0"/>
+          <a:chExt cx="0" cy="0"/>
+        </a:xfrm>
+      </p:grpSpPr>
+      <p:pic>
+        <p:nvPicPr>
+          <p:cNvPr id="7" name="Image 6">
+            <a:extLst>
+              <a:ext uri="{FF2B5EF4-FFF2-40B4-BE49-F238E27FC236}">
+                <a16:creationId xmlns:a16="http://schemas.microsoft.com/office/drawing/2014/main" id="{334A4655-492C-C1AD-1CDD-19240CB39533}"/>
+              </a:ext>
+            </a:extLst>
+          </p:cNvPr>
+          <p:cNvPicPr>
+            <a:picLocks noChangeAspect="1"/>
+          </p:cNvPicPr>
+          <p:nvPr/>
+        </p:nvPicPr>
+        <p:blipFill>
+          <a:blip r:embed="rId2"/>
+          <a:stretch>
+            <a:fillRect/>
+          </a:stretch>
+        </p:blipFill>
+        <p:spPr>
+          <a:xfrm>
+            <a:off x="251520" y="476672"/>
+            <a:ext cx="2782810" cy="2787833"/>
+          </a:xfrm>
+          <a:prstGeom prst="rect">
+            <a:avLst/>
+          </a:prstGeom>
+        </p:spPr>
+      </p:pic>
+    </p:spTree>
+    <p:extLst>
+      <p:ext uri="{BB962C8B-B14F-4D97-AF65-F5344CB8AC3E}">
+        <p14:creationId xmlns:p14="http://schemas.microsoft.com/office/powerpoint/2010/main" val="1917779945"/>
+      </p:ext>
+    </p:extLst>
+  </p:cSld>
+  <p:clrMapOvr>
+    <a:masterClrMapping/>
+  </p:clrMapOvr>
+  <p:transition>
+    <p:fade/>
+  </p:transition>
+</p:sld>
+</file>
+
+<file path=ppt/slides/slide4.xml><?xml version="1.0" encoding="utf-8"?>
+<p:sld xmlns:a="http://schemas.openxmlformats.org/drawingml/2006/main" xmlns:r="http://schemas.openxmlformats.org/officeDocument/2006/relationships" xmlns:p="http://schemas.openxmlformats.org/presentationml/2006/main">
+  <p:cSld>
+    <p:spTree>
+      <p:nvGrpSpPr>
+        <p:cNvPr id="1" name=""/>
+        <p:cNvGrpSpPr/>
+        <p:nvPr/>
+      </p:nvGrpSpPr>
+      <p:grpSpPr>
+        <a:xfrm>
+          <a:off x="0" y="0"/>
+          <a:ext cx="0" cy="0"/>
+          <a:chOff x="0" y="0"/>
+          <a:chExt cx="0" cy="0"/>
+        </a:xfrm>
+      </p:grpSpPr>
+      <p:pic>
+        <p:nvPicPr>
+          <p:cNvPr id="7" name="Image 6">
+            <a:extLst>
+              <a:ext uri="{FF2B5EF4-FFF2-40B4-BE49-F238E27FC236}">
+                <a16:creationId xmlns:a16="http://schemas.microsoft.com/office/drawing/2014/main" id="{334A4655-492C-C1AD-1CDD-19240CB39533}"/>
+              </a:ext>
+            </a:extLst>
+          </p:cNvPr>
+          <p:cNvPicPr>
+            <a:picLocks noChangeAspect="1"/>
+          </p:cNvPicPr>
+          <p:nvPr/>
+        </p:nvPicPr>
+        <p:blipFill>
+          <a:blip r:embed="rId2"/>
+          <a:stretch>
+            <a:fillRect/>
+          </a:stretch>
+        </p:blipFill>
+        <p:spPr>
+          <a:xfrm>
+            <a:off x="251520" y="476672"/>
+            <a:ext cx="2782810" cy="2787833"/>
+          </a:xfrm>
+          <a:prstGeom prst="rect">
+            <a:avLst/>
+          </a:prstGeom>
+        </p:spPr>
+      </p:pic>
+      <p:pic>
+        <p:nvPicPr>
+          <p:cNvPr id="9" name="Image 8">
+            <a:extLst>
+              <a:ext uri="{FF2B5EF4-FFF2-40B4-BE49-F238E27FC236}">
+                <a16:creationId xmlns:a16="http://schemas.microsoft.com/office/drawing/2014/main" id="{9814D9E7-C8A1-520A-1098-3AC05335FA38}"/>
+              </a:ext>
+            </a:extLst>
+          </p:cNvPr>
+          <p:cNvPicPr>
+            <a:picLocks noChangeAspect="1"/>
+          </p:cNvPicPr>
+          <p:nvPr/>
+        </p:nvPicPr>
+        <p:blipFill>
+          <a:blip r:embed="rId3"/>
+          <a:stretch>
+            <a:fillRect/>
+          </a:stretch>
+        </p:blipFill>
+        <p:spPr>
+          <a:xfrm>
+            <a:off x="6109672" y="470541"/>
+            <a:ext cx="2777823" cy="2787833"/>
+          </a:xfrm>
+          <a:prstGeom prst="rect">
+            <a:avLst/>
+          </a:prstGeom>
+        </p:spPr>
+      </p:pic>
+    </p:spTree>
+    <p:extLst>
+      <p:ext uri="{BB962C8B-B14F-4D97-AF65-F5344CB8AC3E}">
+        <p14:creationId xmlns:p14="http://schemas.microsoft.com/office/powerpoint/2010/main" val="3286002063"/>
+      </p:ext>
+    </p:extLst>
+  </p:cSld>
+  <p:clrMapOvr>
+    <a:masterClrMapping/>
+  </p:clrMapOvr>
+  <p:transition>
+    <p:fade/>
+  </p:transition>
+</p:sld>
+</file>
+
+<file path=ppt/slides/slide5.xml><?xml version="1.0" encoding="utf-8"?>
+<p:sld xmlns:a="http://schemas.openxmlformats.org/drawingml/2006/main" xmlns:r="http://schemas.openxmlformats.org/officeDocument/2006/relationships" xmlns:p="http://schemas.openxmlformats.org/presentationml/2006/main">
+  <p:cSld>
+    <p:spTree>
+      <p:nvGrpSpPr>
+        <p:cNvPr id="1" name=""/>
+        <p:cNvGrpSpPr/>
+        <p:nvPr/>
+      </p:nvGrpSpPr>
+      <p:grpSpPr>
+        <a:xfrm>
+          <a:off x="0" y="0"/>
+          <a:ext cx="0" cy="0"/>
+          <a:chOff x="0" y="0"/>
+          <a:chExt cx="0" cy="0"/>
+        </a:xfrm>
+      </p:grpSpPr>
+      <p:pic>
+        <p:nvPicPr>
+          <p:cNvPr id="7" name="Image 6">
+            <a:extLst>
+              <a:ext uri="{FF2B5EF4-FFF2-40B4-BE49-F238E27FC236}">
+                <a16:creationId xmlns:a16="http://schemas.microsoft.com/office/drawing/2014/main" id="{334A4655-492C-C1AD-1CDD-19240CB39533}"/>
+              </a:ext>
+            </a:extLst>
+          </p:cNvPr>
+          <p:cNvPicPr>
+            <a:picLocks noChangeAspect="1"/>
+          </p:cNvPicPr>
+          <p:nvPr/>
+        </p:nvPicPr>
+        <p:blipFill>
+          <a:blip r:embed="rId2"/>
+          <a:stretch>
+            <a:fillRect/>
+          </a:stretch>
+        </p:blipFill>
+        <p:spPr>
+          <a:xfrm>
+            <a:off x="251520" y="476672"/>
+            <a:ext cx="2782810" cy="2787833"/>
+          </a:xfrm>
+          <a:prstGeom prst="rect">
+            <a:avLst/>
+          </a:prstGeom>
+        </p:spPr>
+      </p:pic>
+      <p:pic>
+        <p:nvPicPr>
+          <p:cNvPr id="9" name="Image 8">
+            <a:extLst>
+              <a:ext uri="{FF2B5EF4-FFF2-40B4-BE49-F238E27FC236}">
+                <a16:creationId xmlns:a16="http://schemas.microsoft.com/office/drawing/2014/main" id="{9814D9E7-C8A1-520A-1098-3AC05335FA38}"/>
+              </a:ext>
+            </a:extLst>
+          </p:cNvPr>
+          <p:cNvPicPr>
+            <a:picLocks noChangeAspect="1"/>
+          </p:cNvPicPr>
+          <p:nvPr/>
+        </p:nvPicPr>
+        <p:blipFill>
+          <a:blip r:embed="rId3"/>
+          <a:stretch>
+            <a:fillRect/>
+          </a:stretch>
+        </p:blipFill>
+        <p:spPr>
+          <a:xfrm>
+            <a:off x="6109672" y="470541"/>
+            <a:ext cx="2777823" cy="2787833"/>
+          </a:xfrm>
+          <a:prstGeom prst="rect">
+            <a:avLst/>
+          </a:prstGeom>
+        </p:spPr>
+      </p:pic>
+      <p:pic>
+        <p:nvPicPr>
+          <p:cNvPr id="11" name="Image 10">
+            <a:extLst>
+              <a:ext uri="{FF2B5EF4-FFF2-40B4-BE49-F238E27FC236}">
+                <a16:creationId xmlns:a16="http://schemas.microsoft.com/office/drawing/2014/main" id="{B7C6F0EC-65B1-F0EC-1565-A321E16FBEDF}"/>
+              </a:ext>
+            </a:extLst>
+          </p:cNvPr>
+          <p:cNvPicPr>
+            <a:picLocks noChangeAspect="1"/>
+          </p:cNvPicPr>
+          <p:nvPr/>
+        </p:nvPicPr>
+        <p:blipFill>
+          <a:blip r:embed="rId4"/>
+          <a:stretch>
+            <a:fillRect/>
+          </a:stretch>
+        </p:blipFill>
+        <p:spPr>
+          <a:xfrm>
+            <a:off x="251520" y="3593496"/>
+            <a:ext cx="2777823" cy="2782792"/>
+          </a:xfrm>
+          <a:prstGeom prst="rect">
+            <a:avLst/>
+          </a:prstGeom>
+        </p:spPr>
+      </p:pic>
+    </p:spTree>
+    <p:extLst>
+      <p:ext uri="{BB962C8B-B14F-4D97-AF65-F5344CB8AC3E}">
+        <p14:creationId xmlns:p14="http://schemas.microsoft.com/office/powerpoint/2010/main" val="1994634688"/>
+      </p:ext>
+    </p:extLst>
+  </p:cSld>
+  <p:clrMapOvr>
+    <a:masterClrMapping/>
+  </p:clrMapOvr>
+  <p:transition>
+    <p:fade/>
+  </p:transition>
+</p:sld>
+</file>
+
+<file path=ppt/slides/slide6.xml><?xml version="1.0" encoding="utf-8"?>
+<p:sld xmlns:a="http://schemas.openxmlformats.org/drawingml/2006/main" xmlns:r="http://schemas.openxmlformats.org/officeDocument/2006/relationships" xmlns:p="http://schemas.openxmlformats.org/presentationml/2006/main">
+  <p:cSld>
+    <p:spTree>
+      <p:nvGrpSpPr>
+        <p:cNvPr id="1" name=""/>
+        <p:cNvGrpSpPr/>
+        <p:nvPr/>
+      </p:nvGrpSpPr>
+      <p:grpSpPr>
+        <a:xfrm>
+          <a:off x="0" y="0"/>
+          <a:ext cx="0" cy="0"/>
+          <a:chOff x="0" y="0"/>
+          <a:chExt cx="0" cy="0"/>
+        </a:xfrm>
+      </p:grpSpPr>
+      <p:pic>
+        <p:nvPicPr>
+          <p:cNvPr id="7" name="Image 6">
+            <a:extLst>
+              <a:ext uri="{FF2B5EF4-FFF2-40B4-BE49-F238E27FC236}">
+                <a16:creationId xmlns:a16="http://schemas.microsoft.com/office/drawing/2014/main" id="{334A4655-492C-C1AD-1CDD-19240CB39533}"/>
+              </a:ext>
+            </a:extLst>
+          </p:cNvPr>
+          <p:cNvPicPr>
+            <a:picLocks noChangeAspect="1"/>
+          </p:cNvPicPr>
+          <p:nvPr/>
+        </p:nvPicPr>
+        <p:blipFill>
+          <a:blip r:embed="rId2"/>
+          <a:stretch>
+            <a:fillRect/>
+          </a:stretch>
+        </p:blipFill>
+        <p:spPr>
+          <a:xfrm>
+            <a:off x="251520" y="476672"/>
+            <a:ext cx="2782810" cy="2787833"/>
+          </a:xfrm>
+          <a:prstGeom prst="rect">
+            <a:avLst/>
+          </a:prstGeom>
+        </p:spPr>
+      </p:pic>
+      <p:pic>
+        <p:nvPicPr>
+          <p:cNvPr id="9" name="Image 8">
+            <a:extLst>
+              <a:ext uri="{FF2B5EF4-FFF2-40B4-BE49-F238E27FC236}">
+                <a16:creationId xmlns:a16="http://schemas.microsoft.com/office/drawing/2014/main" id="{9814D9E7-C8A1-520A-1098-3AC05335FA38}"/>
+              </a:ext>
+            </a:extLst>
+          </p:cNvPr>
+          <p:cNvPicPr>
+            <a:picLocks noChangeAspect="1"/>
+          </p:cNvPicPr>
+          <p:nvPr/>
+        </p:nvPicPr>
+        <p:blipFill>
+          <a:blip r:embed="rId3"/>
+          <a:stretch>
+            <a:fillRect/>
+          </a:stretch>
+        </p:blipFill>
+        <p:spPr>
+          <a:xfrm>
+            <a:off x="6109672" y="470541"/>
+            <a:ext cx="2777823" cy="2787833"/>
+          </a:xfrm>
+          <a:prstGeom prst="rect">
+            <a:avLst/>
+          </a:prstGeom>
+        </p:spPr>
+      </p:pic>
+      <p:pic>
+        <p:nvPicPr>
+          <p:cNvPr id="11" name="Image 10">
+            <a:extLst>
+              <a:ext uri="{FF2B5EF4-FFF2-40B4-BE49-F238E27FC236}">
+                <a16:creationId xmlns:a16="http://schemas.microsoft.com/office/drawing/2014/main" id="{B7C6F0EC-65B1-F0EC-1565-A321E16FBEDF}"/>
+              </a:ext>
+            </a:extLst>
+          </p:cNvPr>
+          <p:cNvPicPr>
+            <a:picLocks noChangeAspect="1"/>
+          </p:cNvPicPr>
+          <p:nvPr/>
+        </p:nvPicPr>
+        <p:blipFill>
+          <a:blip r:embed="rId4"/>
+          <a:stretch>
+            <a:fillRect/>
+          </a:stretch>
+        </p:blipFill>
+        <p:spPr>
+          <a:xfrm>
+            <a:off x="251520" y="3593496"/>
+            <a:ext cx="2777823" cy="2782792"/>
+          </a:xfrm>
+          <a:prstGeom prst="rect">
+            <a:avLst/>
+          </a:prstGeom>
+        </p:spPr>
+      </p:pic>
+      <p:pic>
+        <p:nvPicPr>
+          <p:cNvPr id="13" name="Image 12">
+            <a:extLst>
+              <a:ext uri="{FF2B5EF4-FFF2-40B4-BE49-F238E27FC236}">
+                <a16:creationId xmlns:a16="http://schemas.microsoft.com/office/drawing/2014/main" id="{852E51DF-A117-0C86-92C1-B382F8ADFB55}"/>
+              </a:ext>
+            </a:extLst>
+          </p:cNvPr>
+          <p:cNvPicPr>
+            <a:picLocks noChangeAspect="1"/>
+          </p:cNvPicPr>
+          <p:nvPr/>
+        </p:nvPicPr>
+        <p:blipFill>
+          <a:blip r:embed="rId5"/>
+          <a:stretch>
+            <a:fillRect/>
+          </a:stretch>
+        </p:blipFill>
+        <p:spPr>
+          <a:xfrm>
+            <a:off x="6109671" y="3593496"/>
+            <a:ext cx="2777823" cy="2782792"/>
+          </a:xfrm>
+          <a:prstGeom prst="rect">
+            <a:avLst/>
+          </a:prstGeom>
+        </p:spPr>
+      </p:pic>
+    </p:spTree>
+    <p:extLst>
+      <p:ext uri="{BB962C8B-B14F-4D97-AF65-F5344CB8AC3E}">
+        <p14:creationId xmlns:p14="http://schemas.microsoft.com/office/powerpoint/2010/main" val="3441244957"/>
+      </p:ext>
+    </p:extLst>
+  </p:cSld>
+  <p:clrMapOvr>
+    <a:masterClrMapping/>
+  </p:clrMapOvr>
+  <p:transition>
+    <p:fade/>
+  </p:transition>
+</p:sld>
+</file>
+
+<file path=ppt/slides/slide7.xml><?xml version="1.0" encoding="utf-8"?>
+<p:sld xmlns:a="http://schemas.openxmlformats.org/drawingml/2006/main" xmlns:r="http://schemas.openxmlformats.org/officeDocument/2006/relationships" xmlns:p="http://schemas.openxmlformats.org/presentationml/2006/main">
+  <p:cSld>
+    <p:spTree>
+      <p:nvGrpSpPr>
+        <p:cNvPr id="1" name=""/>
+        <p:cNvGrpSpPr/>
+        <p:nvPr/>
+      </p:nvGrpSpPr>
+      <p:grpSpPr>
+        <a:xfrm>
+          <a:off x="0" y="0"/>
+          <a:ext cx="0" cy="0"/>
+          <a:chOff x="0" y="0"/>
+          <a:chExt cx="0" cy="0"/>
+        </a:xfrm>
+      </p:grpSpPr>
+      <p:sp>
+        <p:nvSpPr>
+          <p:cNvPr id="4" name="ZoneTexte 3">
+            <a:extLst>
+              <a:ext uri="{FF2B5EF4-FFF2-40B4-BE49-F238E27FC236}">
+                <a16:creationId xmlns:a16="http://schemas.microsoft.com/office/drawing/2014/main" id="{06BF862B-D8A7-1544-37B4-09E594EF052F}"/>
+              </a:ext>
+            </a:extLst>
+          </p:cNvPr>
+          <p:cNvSpPr txBox="1"/>
+          <p:nvPr/>
+        </p:nvSpPr>
+        <p:spPr>
+          <a:xfrm>
+            <a:off x="563851" y="332656"/>
+            <a:ext cx="8256621" cy="954107"/>
+          </a:xfrm>
+          <a:prstGeom prst="rect">
+            <a:avLst/>
+          </a:prstGeom>
+        </p:spPr>
+        <p:style>
+          <a:lnRef idx="3">
+            <a:schemeClr val="lt1"/>
+          </a:lnRef>
+          <a:fillRef idx="1">
+            <a:schemeClr val="dk1"/>
+          </a:fillRef>
+          <a:effectRef idx="1">
+            <a:schemeClr val="dk1"/>
+          </a:effectRef>
+          <a:fontRef idx="minor">
+            <a:schemeClr val="lt1"/>
+          </a:fontRef>
+        </p:style>
+        <p:txBody>
+          <a:bodyPr wrap="square" rtlCol="0">
+            <a:spAutoFit/>
+          </a:bodyPr>
+          <a:lstStyle/>
+          <a:p>
+            <a:pPr algn="ctr"/>
+            <a:r>
+              <a:rPr lang="en-US" sz="2800" b="1" dirty="0">
+                <a:highlight>
+                  <a:srgbClr val="000000"/>
+                </a:highlight>
+              </a:rPr>
+              <a:t>3D render of a cute pig with sunglasses doing a dab on a dark blue background, digital art</a:t>
+            </a:r>
+            <a:endParaRPr lang="fr-FR" sz="2800" b="1" dirty="0">
+              <a:highlight>
+                <a:srgbClr val="000000"/>
+              </a:highlight>
+            </a:endParaRPr>
+          </a:p>
+        </p:txBody>
+      </p:sp>
+      <p:pic>
+        <p:nvPicPr>
+          <p:cNvPr id="12" name="Image 11" descr="Une image contenant lunettes, lunettes de protection, cache-œil, lunettes de soleil&#10;&#10;Description générée automatiquement">
+            <a:extLst>
+              <a:ext uri="{FF2B5EF4-FFF2-40B4-BE49-F238E27FC236}">
+                <a16:creationId xmlns:a16="http://schemas.microsoft.com/office/drawing/2014/main" id="{03627D89-5CC9-5076-173A-DC898B174970}"/>
+              </a:ext>
+            </a:extLst>
+          </p:cNvPr>
+          <p:cNvPicPr>
+            <a:picLocks noChangeAspect="1"/>
+          </p:cNvPicPr>
+          <p:nvPr/>
+        </p:nvPicPr>
+        <p:blipFill>
+          <a:blip r:embed="rId2" cstate="print">
+            <a:extLst>
+              <a:ext uri="{28A0092B-C50C-407E-A947-70E740481C1C}">
+                <a14:useLocalDpi xmlns:a14="http://schemas.microsoft.com/office/drawing/2010/main" val="0"/>
+              </a:ext>
+            </a:extLst>
+          </a:blip>
+          <a:stretch>
+            <a:fillRect/>
+          </a:stretch>
+        </p:blipFill>
+        <p:spPr>
+          <a:xfrm>
+            <a:off x="386560" y="1436763"/>
+            <a:ext cx="2582856" cy="2582856"/>
+          </a:xfrm>
+          <a:prstGeom prst="rect">
+            <a:avLst/>
+          </a:prstGeom>
+        </p:spPr>
+      </p:pic>
+    </p:spTree>
+    <p:extLst>
+      <p:ext uri="{BB962C8B-B14F-4D97-AF65-F5344CB8AC3E}">
+        <p14:creationId xmlns:p14="http://schemas.microsoft.com/office/powerpoint/2010/main" val="192690775"/>
+      </p:ext>
+    </p:extLst>
+  </p:cSld>
+  <p:clrMapOvr>
+    <a:masterClrMapping/>
+  </p:clrMapOvr>
+  <p:transition>
+    <p:fade/>
+  </p:transition>
+</p:sld>
+</file>
+
+<file path=ppt/slides/slide8.xml><?xml version="1.0" encoding="utf-8"?>
+<p:sld xmlns:a="http://schemas.openxmlformats.org/drawingml/2006/main" xmlns:r="http://schemas.openxmlformats.org/officeDocument/2006/relationships" xmlns:p="http://schemas.openxmlformats.org/presentationml/2006/main">
+  <p:cSld>
+    <p:spTree>
+      <p:nvGrpSpPr>
+        <p:cNvPr id="1" name=""/>
+        <p:cNvGrpSpPr/>
+        <p:nvPr/>
+      </p:nvGrpSpPr>
+      <p:grpSpPr>
+        <a:xfrm>
+          <a:off x="0" y="0"/>
+          <a:ext cx="0" cy="0"/>
+          <a:chOff x="0" y="0"/>
+          <a:chExt cx="0" cy="0"/>
+        </a:xfrm>
+      </p:grpSpPr>
+      <p:sp>
+        <p:nvSpPr>
+          <p:cNvPr id="4" name="ZoneTexte 3">
+            <a:extLst>
+              <a:ext uri="{FF2B5EF4-FFF2-40B4-BE49-F238E27FC236}">
+                <a16:creationId xmlns:a16="http://schemas.microsoft.com/office/drawing/2014/main" id="{06BF862B-D8A7-1544-37B4-09E594EF052F}"/>
+              </a:ext>
+            </a:extLst>
+          </p:cNvPr>
+          <p:cNvSpPr txBox="1"/>
+          <p:nvPr/>
+        </p:nvSpPr>
+        <p:spPr>
+          <a:xfrm>
+            <a:off x="563851" y="332656"/>
+            <a:ext cx="8256621" cy="954107"/>
+          </a:xfrm>
+          <a:prstGeom prst="rect">
+            <a:avLst/>
+          </a:prstGeom>
+        </p:spPr>
+        <p:style>
+          <a:lnRef idx="3">
+            <a:schemeClr val="lt1"/>
+          </a:lnRef>
+          <a:fillRef idx="1">
+            <a:schemeClr val="dk1"/>
+          </a:fillRef>
+          <a:effectRef idx="1">
+            <a:schemeClr val="dk1"/>
+          </a:effectRef>
+          <a:fontRef idx="minor">
+            <a:schemeClr val="lt1"/>
+          </a:fontRef>
+        </p:style>
+        <p:txBody>
+          <a:bodyPr wrap="square" rtlCol="0">
+            <a:spAutoFit/>
+          </a:bodyPr>
+          <a:lstStyle/>
+          <a:p>
+            <a:pPr algn="ctr"/>
+            <a:r>
+              <a:rPr lang="en-US" sz="2800" b="1" dirty="0">
+                <a:highlight>
+                  <a:srgbClr val="000000"/>
+                </a:highlight>
+              </a:rPr>
+              <a:t>3D render of a cute pig with sunglasses doing a dab on a dark blue background, digital art</a:t>
+            </a:r>
+            <a:endParaRPr lang="fr-FR" sz="2800" b="1" dirty="0">
+              <a:highlight>
+                <a:srgbClr val="000000"/>
+              </a:highlight>
+            </a:endParaRPr>
+          </a:p>
+        </p:txBody>
+      </p:sp>
+      <p:pic>
+        <p:nvPicPr>
+          <p:cNvPr id="6" name="Image 5">
+            <a:extLst>
+              <a:ext uri="{FF2B5EF4-FFF2-40B4-BE49-F238E27FC236}">
+                <a16:creationId xmlns:a16="http://schemas.microsoft.com/office/drawing/2014/main" id="{8595E72B-916E-B611-1628-29B809B15786}"/>
+              </a:ext>
+            </a:extLst>
+          </p:cNvPr>
+          <p:cNvPicPr>
+            <a:picLocks noChangeAspect="1"/>
+          </p:cNvPicPr>
+          <p:nvPr/>
+        </p:nvPicPr>
+        <p:blipFill>
+          <a:blip r:embed="rId2" cstate="print">
+            <a:extLst>
+              <a:ext uri="{28A0092B-C50C-407E-A947-70E740481C1C}">
+                <a14:useLocalDpi xmlns:a14="http://schemas.microsoft.com/office/drawing/2010/main" val="0"/>
+              </a:ext>
+            </a:extLst>
+          </a:blip>
+          <a:stretch>
+            <a:fillRect/>
+          </a:stretch>
+        </p:blipFill>
+        <p:spPr>
+          <a:xfrm>
+            <a:off x="386560" y="4241627"/>
+            <a:ext cx="2582856" cy="2582856"/>
+          </a:xfrm>
+          <a:prstGeom prst="rect">
+            <a:avLst/>
+          </a:prstGeom>
+        </p:spPr>
+      </p:pic>
+      <p:pic>
+        <p:nvPicPr>
+          <p:cNvPr id="12" name="Image 11" descr="Une image contenant lunettes, lunettes de protection, cache-œil, lunettes de soleil&#10;&#10;Description générée automatiquement">
+            <a:extLst>
+              <a:ext uri="{FF2B5EF4-FFF2-40B4-BE49-F238E27FC236}">
+                <a16:creationId xmlns:a16="http://schemas.microsoft.com/office/drawing/2014/main" id="{03627D89-5CC9-5076-173A-DC898B174970}"/>
+              </a:ext>
+            </a:extLst>
+          </p:cNvPr>
+          <p:cNvPicPr>
+            <a:picLocks noChangeAspect="1"/>
+          </p:cNvPicPr>
+          <p:nvPr/>
+        </p:nvPicPr>
+        <p:blipFill>
+          <a:blip r:embed="rId3" cstate="print">
+            <a:extLst>
+              <a:ext uri="{28A0092B-C50C-407E-A947-70E740481C1C}">
+                <a14:useLocalDpi xmlns:a14="http://schemas.microsoft.com/office/drawing/2010/main" val="0"/>
+              </a:ext>
+            </a:extLst>
+          </a:blip>
+          <a:stretch>
+            <a:fillRect/>
+          </a:stretch>
+        </p:blipFill>
+        <p:spPr>
+          <a:xfrm>
+            <a:off x="386560" y="1436763"/>
+            <a:ext cx="2582856" cy="2582856"/>
+          </a:xfrm>
+          <a:prstGeom prst="rect">
+            <a:avLst/>
+          </a:prstGeom>
+        </p:spPr>
+      </p:pic>
+    </p:spTree>
+    <p:extLst>
+      <p:ext uri="{BB962C8B-B14F-4D97-AF65-F5344CB8AC3E}">
+        <p14:creationId xmlns:p14="http://schemas.microsoft.com/office/powerpoint/2010/main" val="3973476895"/>
+      </p:ext>
+    </p:extLst>
+  </p:cSld>
+  <p:clrMapOvr>
+    <a:masterClrMapping/>
+  </p:clrMapOvr>
+  <p:transition>
+    <p:fade/>
+  </p:transition>
+</p:sld>
+</file>
+
+<file path=ppt/slides/slide9.xml><?xml version="1.0" encoding="utf-8"?>
+<p:sld xmlns:a="http://schemas.openxmlformats.org/drawingml/2006/main" xmlns:r="http://schemas.openxmlformats.org/officeDocument/2006/relationships" xmlns:p="http://schemas.openxmlformats.org/presentationml/2006/main">
+  <p:cSld>
+    <p:spTree>
+      <p:nvGrpSpPr>
+        <p:cNvPr id="1" name=""/>
+        <p:cNvGrpSpPr/>
+        <p:nvPr/>
+      </p:nvGrpSpPr>
+      <p:grpSpPr>
+        <a:xfrm>
+          <a:off x="0" y="0"/>
+          <a:ext cx="0" cy="0"/>
+          <a:chOff x="0" y="0"/>
+          <a:chExt cx="0" cy="0"/>
+        </a:xfrm>
+      </p:grpSpPr>
+      <p:sp>
+        <p:nvSpPr>
+          <p:cNvPr id="4" name="ZoneTexte 3">
+            <a:extLst>
+              <a:ext uri="{FF2B5EF4-FFF2-40B4-BE49-F238E27FC236}">
+                <a16:creationId xmlns:a16="http://schemas.microsoft.com/office/drawing/2014/main" id="{06BF862B-D8A7-1544-37B4-09E594EF052F}"/>
+              </a:ext>
+            </a:extLst>
+          </p:cNvPr>
+          <p:cNvSpPr txBox="1"/>
+          <p:nvPr/>
+        </p:nvSpPr>
+        <p:spPr>
+          <a:xfrm>
+            <a:off x="563851" y="332656"/>
+            <a:ext cx="8256621" cy="954107"/>
+          </a:xfrm>
+          <a:prstGeom prst="rect">
+            <a:avLst/>
+          </a:prstGeom>
+        </p:spPr>
+        <p:style>
+          <a:lnRef idx="3">
+            <a:schemeClr val="lt1"/>
+          </a:lnRef>
+          <a:fillRef idx="1">
+            <a:schemeClr val="dk1"/>
+          </a:fillRef>
+          <a:effectRef idx="1">
+            <a:schemeClr val="dk1"/>
+          </a:effectRef>
+          <a:fontRef idx="minor">
+            <a:schemeClr val="lt1"/>
+          </a:fontRef>
+        </p:style>
+        <p:txBody>
+          <a:bodyPr wrap="square" rtlCol="0">
+            <a:spAutoFit/>
+          </a:bodyPr>
+          <a:lstStyle/>
+          <a:p>
+            <a:pPr algn="ctr"/>
+            <a:r>
+              <a:rPr lang="en-US" sz="2800" b="1" dirty="0">
+                <a:highlight>
+                  <a:srgbClr val="000000"/>
+                </a:highlight>
+              </a:rPr>
+              <a:t>3D render of a cute pig with sunglasses doing a dab on a dark blue background, digital art</a:t>
+            </a:r>
+            <a:endParaRPr lang="fr-FR" sz="2800" b="1" dirty="0">
+              <a:highlight>
+                <a:srgbClr val="000000"/>
+              </a:highlight>
+            </a:endParaRPr>
+          </a:p>
+        </p:txBody>
+      </p:sp>
+      <p:pic>
+        <p:nvPicPr>
+          <p:cNvPr id="6" name="Image 5">
+            <a:extLst>
+              <a:ext uri="{FF2B5EF4-FFF2-40B4-BE49-F238E27FC236}">
+                <a16:creationId xmlns:a16="http://schemas.microsoft.com/office/drawing/2014/main" id="{8595E72B-916E-B611-1628-29B809B15786}"/>
+              </a:ext>
+            </a:extLst>
+          </p:cNvPr>
+          <p:cNvPicPr>
+            <a:picLocks noChangeAspect="1"/>
+          </p:cNvPicPr>
+          <p:nvPr/>
+        </p:nvPicPr>
+        <p:blipFill>
+          <a:blip r:embed="rId2" cstate="print">
+            <a:extLst>
+              <a:ext uri="{28A0092B-C50C-407E-A947-70E740481C1C}">
+                <a14:useLocalDpi xmlns:a14="http://schemas.microsoft.com/office/drawing/2010/main" val="0"/>
+              </a:ext>
+            </a:extLst>
+          </a:blip>
+          <a:stretch>
+            <a:fillRect/>
+          </a:stretch>
+        </p:blipFill>
+        <p:spPr>
+          <a:xfrm>
+            <a:off x="386560" y="4241627"/>
+            <a:ext cx="2582856" cy="2582856"/>
+          </a:xfrm>
+          <a:prstGeom prst="rect">
+            <a:avLst/>
+          </a:prstGeom>
+        </p:spPr>
+      </p:pic>
+      <p:pic>
+        <p:nvPicPr>
+          <p:cNvPr id="8" name="Image 7" descr="Une image contenant lunettes, lunettes de protection, accessoire, lunettes de soleil&#10;&#10;Description générée automatiquement">
+            <a:extLst>
+              <a:ext uri="{FF2B5EF4-FFF2-40B4-BE49-F238E27FC236}">
+                <a16:creationId xmlns:a16="http://schemas.microsoft.com/office/drawing/2014/main" id="{B67BBBC4-F518-D4EB-9D70-CC1A613EF95E}"/>
+              </a:ext>
+            </a:extLst>
+          </p:cNvPr>
+          <p:cNvPicPr>
+            <a:picLocks noChangeAspect="1"/>
+          </p:cNvPicPr>
+          <p:nvPr/>
+        </p:nvPicPr>
+        <p:blipFill>
+          <a:blip r:embed="rId3" cstate="print">
+            <a:extLst>
+              <a:ext uri="{28A0092B-C50C-407E-A947-70E740481C1C}">
+                <a14:useLocalDpi xmlns:a14="http://schemas.microsoft.com/office/drawing/2010/main" val="0"/>
+              </a:ext>
+            </a:extLst>
+          </a:blip>
+          <a:stretch>
+            <a:fillRect/>
+          </a:stretch>
+        </p:blipFill>
+        <p:spPr>
+          <a:xfrm>
+            <a:off x="5868144" y="4241627"/>
+            <a:ext cx="2582856" cy="2582856"/>
+          </a:xfrm>
+          <a:prstGeom prst="rect">
+            <a:avLst/>
+          </a:prstGeom>
+        </p:spPr>
+      </p:pic>
+      <p:pic>
+        <p:nvPicPr>
+          <p:cNvPr id="12" name="Image 11" descr="Une image contenant lunettes, lunettes de protection, cache-œil, lunettes de soleil&#10;&#10;Description générée automatiquement">
+            <a:extLst>
+              <a:ext uri="{FF2B5EF4-FFF2-40B4-BE49-F238E27FC236}">
+                <a16:creationId xmlns:a16="http://schemas.microsoft.com/office/drawing/2014/main" id="{03627D89-5CC9-5076-173A-DC898B174970}"/>
+              </a:ext>
+            </a:extLst>
+          </p:cNvPr>
+          <p:cNvPicPr>
+            <a:picLocks noChangeAspect="1"/>
+          </p:cNvPicPr>
+          <p:nvPr/>
+        </p:nvPicPr>
+        <p:blipFill>
+          <a:blip r:embed="rId4" cstate="print">
+            <a:extLst>
+              <a:ext uri="{28A0092B-C50C-407E-A947-70E740481C1C}">
+                <a14:useLocalDpi xmlns:a14="http://schemas.microsoft.com/office/drawing/2010/main" val="0"/>
+              </a:ext>
+            </a:extLst>
+          </a:blip>
+          <a:stretch>
+            <a:fillRect/>
+          </a:stretch>
+        </p:blipFill>
+        <p:spPr>
+          <a:xfrm>
+            <a:off x="386560" y="1436763"/>
+            <a:ext cx="2582856" cy="2582856"/>
+          </a:xfrm>
+          <a:prstGeom prst="rect">
+            <a:avLst/>
+          </a:prstGeom>
+        </p:spPr>
+      </p:pic>
+    </p:spTree>
+    <p:extLst>
+      <p:ext uri="{BB962C8B-B14F-4D97-AF65-F5344CB8AC3E}">
+        <p14:creationId xmlns:p14="http://schemas.microsoft.com/office/powerpoint/2010/main" val="1591607921"/>
       </p:ext>
     </p:extLst>
   </p:cSld>
@@ -3084,6 +3520,15 @@
 </file>
 
 <file path=customXml/item1.xml><?xml version="1.0" encoding="utf-8"?>
+<?mso-contentType ?>
+<FormTemplates xmlns="http://schemas.microsoft.com/sharepoint/v3/contenttype/forms">
+  <Display>DocumentLibraryForm</Display>
+  <Edit>AssetEditForm</Edit>
+  <New>DocumentLibraryForm</New>
+</FormTemplates>
+</file>
+
+<file path=customXml/item2.xml><?xml version="1.0" encoding="utf-8"?>
 <p:properties xmlns:p="http://schemas.microsoft.com/office/2006/metadata/properties" xmlns:xsi="http://www.w3.org/2001/XMLSchema-instance">
   <documentManagement>
     <APDescription xmlns="6d93d202-47fc-4405-873a-cab67cc5f1b2" xsi:nil="true"/>
@@ -3221,15 +3666,6 @@
     <LocMarketGroupTiers2 xmlns="6d93d202-47fc-4405-873a-cab67cc5f1b2" xsi:nil="true"/>
   </documentManagement>
 </p:properties>
-</file>
-
-<file path=customXml/item2.xml><?xml version="1.0" encoding="utf-8"?>
-<?mso-contentType ?>
-<FormTemplates xmlns="http://schemas.microsoft.com/sharepoint/v3/contenttype/forms">
-  <Display>DocumentLibraryForm</Display>
-  <Edit>AssetEditForm</Edit>
-  <New>DocumentLibraryForm</New>
-</FormTemplates>
 </file>
 
 <file path=customXml/item3.xml><?xml version="1.0" encoding="utf-8"?>
@@ -4292,20 +4728,26 @@
 </file>
 
 <file path=customXml/itemProps1.xml><?xml version="1.0" encoding="utf-8"?>
-<ds:datastoreItem xmlns:ds="http://schemas.openxmlformats.org/officeDocument/2006/customXml" ds:itemID="{D647BF8E-C7AD-49C2-BFFB-C5765C319574}">
+<ds:datastoreItem xmlns:ds="http://schemas.openxmlformats.org/officeDocument/2006/customXml" ds:itemID="{CD5C41E8-B092-4922-A6CC-2AB24793D827}">
   <ds:schemaRefs>
-    <ds:schemaRef ds:uri="http://schemas.microsoft.com/office/2006/metadata/properties"/>
-    <ds:schemaRef ds:uri="6d93d202-47fc-4405-873a-cab67cc5f1b2"/>
-    <ds:schemaRef ds:uri="http://schemas.microsoft.com/office/infopath/2007/PartnerControls"/>
-    <ds:schemaRef ds:uri="64acb2c5-0a2b-4bda-bd34-58e36cbb80d2"/>
+    <ds:schemaRef ds:uri="http://schemas.microsoft.com/sharepoint/v3/contenttype/forms"/>
   </ds:schemaRefs>
 </ds:datastoreItem>
 </file>
 
 <file path=customXml/itemProps2.xml><?xml version="1.0" encoding="utf-8"?>
-<ds:datastoreItem xmlns:ds="http://schemas.openxmlformats.org/officeDocument/2006/customXml" ds:itemID="{CD5C41E8-B092-4922-A6CC-2AB24793D827}">
+<ds:datastoreItem xmlns:ds="http://schemas.openxmlformats.org/officeDocument/2006/customXml" ds:itemID="{D647BF8E-C7AD-49C2-BFFB-C5765C319574}">
   <ds:schemaRefs>
-    <ds:schemaRef ds:uri="http://schemas.microsoft.com/sharepoint/v3/contenttype/forms"/>
+    <ds:schemaRef ds:uri="http://purl.org/dc/terms/"/>
+    <ds:schemaRef ds:uri="http://www.w3.org/XML/1998/namespace"/>
+    <ds:schemaRef ds:uri="64acb2c5-0a2b-4bda-bd34-58e36cbb80d2"/>
+    <ds:schemaRef ds:uri="http://schemas.openxmlformats.org/package/2006/metadata/core-properties"/>
+    <ds:schemaRef ds:uri="http://purl.org/dc/dcmitype/"/>
+    <ds:schemaRef ds:uri="http://schemas.microsoft.com/office/2006/metadata/properties"/>
+    <ds:schemaRef ds:uri="http://schemas.microsoft.com/office/2006/documentManagement/types"/>
+    <ds:schemaRef ds:uri="http://schemas.microsoft.com/office/infopath/2007/PartnerControls"/>
+    <ds:schemaRef ds:uri="6d93d202-47fc-4405-873a-cab67cc5f1b2"/>
+    <ds:schemaRef ds:uri="http://purl.org/dc/elements/1.1/"/>
   </ds:schemaRefs>
 </ds:datastoreItem>
 </file>

</xml_diff>